<commit_message>
configuring for dev mode - sync with remote after here
</commit_message>
<xml_diff>
--- a/value-calculator-logic/output.pptx
+++ b/value-calculator-logic/output.pptx
@@ -9460,11 +9460,11 @@
                 </a:defRPr>
               </a:pPr>
               <a:r>
-                <a:t>■契約更新対象者数 : 111名</a:t>
+                <a:t>■契約更新対象者数 : 11名</a:t>
               </a:r>
               <a:br/>
               <a:r>
-                <a:t>■店長の時給 : 2,222円</a:t>
+                <a:t>■店長の時給 : 12円</a:t>
               </a:r>
               <a:br/>
               <a:r>
@@ -9577,7 +9577,7 @@
             <a:p>
               <a:pPr/>
               <a:r>
-                <a:t>111人</a:t>
+                <a:t>11人</a:t>
               </a:r>
             </a:p>
           </p:txBody>
@@ -9686,7 +9686,7 @@
             <a:p>
               <a:pPr/>
               <a:r>
-                <a:t>124分</a:t>
+                <a:t>65分</a:t>
               </a:r>
             </a:p>
           </p:txBody>
@@ -9795,7 +9795,7 @@
             <a:p>
               <a:pPr/>
               <a:r>
-                <a:t>41,292分</a:t>
+                <a:t>2,145分</a:t>
               </a:r>
             </a:p>
           </p:txBody>
@@ -10002,7 +10002,7 @@
               </a:r>
               <a:br/>
               <a:r>
-                <a:t>688時間</a:t>
+                <a:t>36時間</a:t>
               </a:r>
             </a:p>
           </p:txBody>
@@ -10302,7 +10302,7 @@
             <a:p>
               <a:pPr/>
               <a:r>
-                <a:t>111人</a:t>
+                <a:t>11人</a:t>
               </a:r>
             </a:p>
           </p:txBody>
@@ -10524,7 +10524,7 @@
             <a:p>
               <a:pPr/>
               <a:r>
-                <a:t>999分</a:t>
+                <a:t>99分</a:t>
               </a:r>
             </a:p>
           </p:txBody>
@@ -10731,7 +10731,7 @@
               </a:r>
               <a:br/>
               <a:r>
-                <a:t>17時間</a:t>
+                <a:t>2時間</a:t>
               </a:r>
             </a:p>
           </p:txBody>
@@ -11549,11 +11549,11 @@
                 </a:defRPr>
               </a:pPr>
               <a:r>
-                <a:t>■契約更新対象者数 : 111名</a:t>
+                <a:t>■契約更新対象者数 : 11名</a:t>
               </a:r>
               <a:br/>
               <a:r>
-                <a:t>■店長の時給 : 2,222円</a:t>
+                <a:t>■店長の時給 : 12円</a:t>
               </a:r>
               <a:br/>
               <a:r>
@@ -11666,7 +11666,7 @@
             <a:p>
               <a:pPr/>
               <a:r>
-                <a:t>688時間</a:t>
+                <a:t>36時間</a:t>
               </a:r>
             </a:p>
           </p:txBody>
@@ -11775,7 +11775,7 @@
             <a:p>
               <a:pPr/>
               <a:r>
-                <a:t>2222円</a:t>
+                <a:t>12円</a:t>
               </a:r>
             </a:p>
           </p:txBody>
@@ -11884,7 +11884,7 @@
             <a:p>
               <a:pPr/>
               <a:r>
-                <a:t>4,586,208円</a:t>
+                <a:t>1,296円</a:t>
               </a:r>
             </a:p>
           </p:txBody>
@@ -12434,7 +12434,7 @@
             <a:p>
               <a:pPr/>
               <a:r>
-                <a:t>17時間</a:t>
+                <a:t>2時間</a:t>
               </a:r>
             </a:p>
           </p:txBody>
@@ -12656,7 +12656,7 @@
             <a:p>
               <a:pPr/>
               <a:r>
-                <a:t>102,000円</a:t>
+                <a:t>12,000円</a:t>
               </a:r>
             </a:p>
           </p:txBody>
@@ -13020,7 +13020,7 @@
             <a:p>
               <a:pPr/>
               <a:r>
-                <a:t>151,950円</a:t>
+                <a:t>16,950円</a:t>
               </a:r>
             </a:p>
           </p:txBody>
@@ -13240,7 +13240,7 @@
             <a:p>
               <a:pPr/>
               <a:r>
-                <a:t>111人</a:t>
+                <a:t>11人</a:t>
               </a:r>
             </a:p>
           </p:txBody>
@@ -13462,7 +13462,7 @@
             <a:p>
               <a:pPr/>
               <a:r>
-                <a:t>49,950円</a:t>
+                <a:t>4,950円</a:t>
               </a:r>
             </a:p>
           </p:txBody>

</xml_diff>